<commit_message>
Screen Flow Diagram and Screen Sketches
I completed the Screen Flow Diagram and the Nav-Bar Side Menu and Misc.
Side Menu Screen Sketches. All three pdfs are in Screen Sketches Folder
</commit_message>
<xml_diff>
--- a/ScreenSketches/Storyboard Design.pptx
+++ b/ScreenSketches/Storyboard Design.pptx
@@ -14011,6 +14011,13 @@
   <p:clrMapOvr>
     <a:masterClrMapping/>
   </p:clrMapOvr>
+  <p:timing>
+    <p:tnLst>
+      <p:par>
+        <p:cTn id="1" dur="indefinite" restart="never" nodeType="tmRoot"/>
+      </p:par>
+    </p:tnLst>
+  </p:timing>
 </p:sld>
 </file>
 
@@ -14039,7 +14046,7 @@
         </p:nvSpPr>
         <p:spPr>
           <a:xfrm>
-            <a:off x="-402361" y="3342125"/>
+            <a:off x="-29215" y="2803377"/>
             <a:ext cx="2251710" cy="1077218"/>
           </a:xfrm>
           <a:prstGeom prst="rect">
@@ -14055,13 +14062,34 @@
           <a:p>
             <a:pPr algn="ctr"/>
             <a:r>
-              <a:rPr lang="en-US" sz="3200" u="sng" smtClean="0">
+              <a:rPr lang="en-US" sz="3200" u="sng" dirty="0" err="1" smtClean="0">
+                <a:latin typeface="Arial" charset="0"/>
+                <a:ea typeface="Arial" charset="0"/>
+                <a:cs typeface="Arial" charset="0"/>
+              </a:rPr>
+              <a:t>Nav</a:t>
+            </a:r>
+            <a:r>
+              <a:rPr lang="en-US" sz="3200" u="sng" dirty="0" smtClean="0">
+                <a:latin typeface="Arial" charset="0"/>
+                <a:ea typeface="Arial" charset="0"/>
+                <a:cs typeface="Arial" charset="0"/>
+              </a:rPr>
+              <a:t> </a:t>
+            </a:r>
+            <a:r>
+              <a:rPr lang="en-US" sz="3200" u="sng" dirty="0" smtClean="0">
                 <a:latin typeface="Arial" charset="0"/>
                 <a:ea typeface="Arial" charset="0"/>
                 <a:cs typeface="Arial" charset="0"/>
               </a:rPr>
               <a:t>Menu </a:t>
             </a:r>
+            <a:endParaRPr lang="en-US" sz="3200" u="sng" dirty="0" smtClean="0">
+              <a:latin typeface="Arial" charset="0"/>
+              <a:ea typeface="Arial" charset="0"/>
+              <a:cs typeface="Arial" charset="0"/>
+            </a:endParaRPr>
           </a:p>
           <a:p>
             <a:pPr algn="ctr"/>
@@ -14098,7 +14126,7 @@
         </p:blipFill>
         <p:spPr>
           <a:xfrm>
-            <a:off x="1702803" y="0"/>
+            <a:off x="2227878" y="0"/>
             <a:ext cx="3440545" cy="6858000"/>
           </a:xfrm>
           <a:prstGeom prst="rect">
@@ -14114,7 +14142,7 @@
         </p:nvSpPr>
         <p:spPr>
           <a:xfrm>
-            <a:off x="1868595" y="1234440"/>
+            <a:off x="2393670" y="1234440"/>
             <a:ext cx="3108960" cy="4480560"/>
           </a:xfrm>
           <a:prstGeom prst="rect">
@@ -14601,7 +14629,7 @@
         </p:nvSpPr>
         <p:spPr>
           <a:xfrm>
-            <a:off x="1713157" y="790936"/>
+            <a:off x="2238232" y="790936"/>
             <a:ext cx="670008" cy="443504"/>
           </a:xfrm>
           <a:prstGeom prst="bracketPair">
@@ -14697,7 +14725,7 @@
         </p:nvSpPr>
         <p:spPr>
           <a:xfrm>
-            <a:off x="2446509" y="1532653"/>
+            <a:off x="2971584" y="1532653"/>
             <a:ext cx="614271" cy="369332"/>
           </a:xfrm>
           <a:prstGeom prst="rect">
@@ -14739,7 +14767,7 @@
         </p:nvSpPr>
         <p:spPr>
           <a:xfrm>
-            <a:off x="3832371" y="1532653"/>
+            <a:off x="4357446" y="1532653"/>
             <a:ext cx="499497" cy="369332"/>
           </a:xfrm>
           <a:prstGeom prst="rect">
@@ -14781,7 +14809,7 @@
         </p:nvSpPr>
         <p:spPr>
           <a:xfrm>
-            <a:off x="1919395" y="2514633"/>
+            <a:off x="2444470" y="2514633"/>
             <a:ext cx="2943537" cy="2880464"/>
           </a:xfrm>
           <a:prstGeom prst="rect">
@@ -14827,7 +14855,7 @@
         </p:blipFill>
         <p:spPr>
           <a:xfrm>
-            <a:off x="3511630" y="3463053"/>
+            <a:off x="4036705" y="3463053"/>
             <a:ext cx="266700" cy="254000"/>
           </a:xfrm>
           <a:prstGeom prst="rect">
@@ -14843,7 +14871,7 @@
         </p:nvSpPr>
         <p:spPr>
           <a:xfrm>
-            <a:off x="2243591" y="1901985"/>
+            <a:off x="2768666" y="1901985"/>
             <a:ext cx="2295144" cy="190238"/>
           </a:xfrm>
           <a:prstGeom prst="roundRect">
@@ -14885,7 +14913,7 @@
         </p:nvSpPr>
         <p:spPr>
           <a:xfrm>
-            <a:off x="2373908" y="2173216"/>
+            <a:off x="2898983" y="2173216"/>
             <a:ext cx="1818296" cy="252096"/>
           </a:xfrm>
           <a:prstGeom prst="rect">
@@ -14927,7 +14955,7 @@
         </p:nvSpPr>
         <p:spPr>
           <a:xfrm>
-            <a:off x="3985595" y="2173216"/>
+            <a:off x="4510670" y="2173216"/>
             <a:ext cx="289506" cy="252095"/>
           </a:xfrm>
           <a:prstGeom prst="rect">
@@ -14969,7 +14997,7 @@
         </p:nvCxnSpPr>
         <p:spPr>
           <a:xfrm>
-            <a:off x="1919395" y="2794525"/>
+            <a:off x="2444470" y="2794525"/>
             <a:ext cx="2943537" cy="0"/>
           </a:xfrm>
           <a:prstGeom prst="line">
@@ -15004,7 +15032,7 @@
         </p:nvCxnSpPr>
         <p:spPr>
           <a:xfrm>
-            <a:off x="1919395" y="3450861"/>
+            <a:off x="2444470" y="3450861"/>
             <a:ext cx="2943537" cy="0"/>
           </a:xfrm>
           <a:prstGeom prst="line">
@@ -15039,7 +15067,7 @@
         </p:nvCxnSpPr>
         <p:spPr>
           <a:xfrm>
-            <a:off x="1919395" y="4108213"/>
+            <a:off x="2444470" y="4108213"/>
             <a:ext cx="2943537" cy="0"/>
           </a:xfrm>
           <a:prstGeom prst="line">
@@ -15074,7 +15102,7 @@
         </p:nvCxnSpPr>
         <p:spPr>
           <a:xfrm>
-            <a:off x="1919395" y="4764549"/>
+            <a:off x="2444470" y="4764549"/>
             <a:ext cx="2943537" cy="0"/>
           </a:xfrm>
           <a:prstGeom prst="line">
@@ -15109,7 +15137,7 @@
         </p:nvCxnSpPr>
         <p:spPr>
           <a:xfrm>
-            <a:off x="1919395" y="5395097"/>
+            <a:off x="2444470" y="5395097"/>
             <a:ext cx="2943537" cy="0"/>
           </a:xfrm>
           <a:prstGeom prst="line">
@@ -15144,7 +15172,7 @@
         </p:nvSpPr>
         <p:spPr>
           <a:xfrm>
-            <a:off x="1868595" y="2468880"/>
+            <a:off x="2393670" y="2468880"/>
             <a:ext cx="1343729" cy="369332"/>
           </a:xfrm>
           <a:prstGeom prst="rect">
@@ -15182,7 +15210,7 @@
         </p:nvSpPr>
         <p:spPr>
           <a:xfrm>
-            <a:off x="2463097" y="3155187"/>
+            <a:off x="2988172" y="3155187"/>
             <a:ext cx="1444626" cy="276999"/>
           </a:xfrm>
           <a:prstGeom prst="rect">
@@ -15212,7 +15240,7 @@
         </p:nvSpPr>
         <p:spPr>
           <a:xfrm>
-            <a:off x="2463097" y="2789360"/>
+            <a:off x="2988172" y="2789360"/>
             <a:ext cx="1430648" cy="307777"/>
           </a:xfrm>
           <a:prstGeom prst="rect">
@@ -15242,7 +15270,7 @@
         </p:nvSpPr>
         <p:spPr>
           <a:xfrm>
-            <a:off x="2477137" y="2982419"/>
+            <a:off x="3002212" y="2982419"/>
             <a:ext cx="1431802" cy="276999"/>
           </a:xfrm>
           <a:prstGeom prst="rect">
@@ -15272,7 +15300,7 @@
         </p:nvSpPr>
         <p:spPr>
           <a:xfrm>
-            <a:off x="1969271" y="2850397"/>
+            <a:off x="2494346" y="2850397"/>
             <a:ext cx="548640" cy="548640"/>
           </a:xfrm>
           <a:prstGeom prst="rect">
@@ -15329,7 +15357,7 @@
         </p:blipFill>
         <p:spPr>
           <a:xfrm>
-            <a:off x="2006263" y="2873958"/>
+            <a:off x="2531338" y="2873958"/>
             <a:ext cx="490359" cy="490359"/>
           </a:xfrm>
           <a:prstGeom prst="rect">
@@ -15345,7 +15373,7 @@
         </p:nvSpPr>
         <p:spPr>
           <a:xfrm>
-            <a:off x="1969271" y="3505470"/>
+            <a:off x="2494346" y="3505470"/>
             <a:ext cx="548640" cy="548640"/>
           </a:xfrm>
           <a:prstGeom prst="rect">
@@ -15388,7 +15416,7 @@
         </p:nvSpPr>
         <p:spPr>
           <a:xfrm>
-            <a:off x="1977582" y="4156035"/>
+            <a:off x="2502657" y="4156035"/>
             <a:ext cx="548640" cy="548640"/>
           </a:xfrm>
           <a:prstGeom prst="rect">
@@ -15431,7 +15459,7 @@
         </p:nvSpPr>
         <p:spPr>
           <a:xfrm>
-            <a:off x="1980716" y="4820428"/>
+            <a:off x="2505791" y="4820428"/>
             <a:ext cx="548640" cy="548640"/>
           </a:xfrm>
           <a:prstGeom prst="rect">
@@ -15488,7 +15516,7 @@
         </p:blipFill>
         <p:spPr>
           <a:xfrm>
-            <a:off x="1937883" y="3482739"/>
+            <a:off x="2462958" y="3482739"/>
             <a:ext cx="600710" cy="600710"/>
           </a:xfrm>
           <a:prstGeom prst="rect">
@@ -15518,7 +15546,7 @@
         </p:blipFill>
         <p:spPr>
           <a:xfrm>
-            <a:off x="2037877" y="4216206"/>
+            <a:off x="2562952" y="4216206"/>
             <a:ext cx="427129" cy="427129"/>
           </a:xfrm>
           <a:prstGeom prst="rect">
@@ -15548,7 +15576,7 @@
         </p:blipFill>
         <p:spPr>
           <a:xfrm>
-            <a:off x="2008746" y="4857481"/>
+            <a:off x="2533821" y="4857481"/>
             <a:ext cx="497025" cy="497025"/>
           </a:xfrm>
           <a:prstGeom prst="rect">
@@ -15564,7 +15592,7 @@
         </p:nvSpPr>
         <p:spPr>
           <a:xfrm>
-            <a:off x="4347059" y="2944075"/>
+            <a:off x="4872134" y="2944075"/>
             <a:ext cx="508473" cy="369332"/>
           </a:xfrm>
           <a:prstGeom prst="rect">
@@ -15594,7 +15622,7 @@
         </p:nvSpPr>
         <p:spPr>
           <a:xfrm>
-            <a:off x="4337735" y="3598347"/>
+            <a:off x="4862810" y="3598347"/>
             <a:ext cx="508473" cy="369332"/>
           </a:xfrm>
           <a:prstGeom prst="rect">
@@ -15624,7 +15652,7 @@
         </p:nvSpPr>
         <p:spPr>
           <a:xfrm>
-            <a:off x="4217371" y="4247881"/>
+            <a:off x="4742446" y="4247881"/>
             <a:ext cx="625492" cy="369332"/>
           </a:xfrm>
           <a:prstGeom prst="rect">
@@ -15654,7 +15682,7 @@
         </p:nvSpPr>
         <p:spPr>
           <a:xfrm>
-            <a:off x="4271588" y="4910082"/>
+            <a:off x="4796663" y="4910082"/>
             <a:ext cx="625492" cy="369332"/>
           </a:xfrm>
           <a:prstGeom prst="rect">
@@ -15684,7 +15712,7 @@
         </p:nvSpPr>
         <p:spPr>
           <a:xfrm>
-            <a:off x="2490011" y="3800945"/>
+            <a:off x="3015086" y="3800945"/>
             <a:ext cx="1293944" cy="276999"/>
           </a:xfrm>
           <a:prstGeom prst="rect">
@@ -15714,7 +15742,7 @@
         </p:nvSpPr>
         <p:spPr>
           <a:xfrm>
-            <a:off x="2490011" y="3435118"/>
+            <a:off x="3015086" y="3435118"/>
             <a:ext cx="656526" cy="307777"/>
           </a:xfrm>
           <a:prstGeom prst="rect">
@@ -15744,7 +15772,7 @@
         </p:nvSpPr>
         <p:spPr>
           <a:xfrm>
-            <a:off x="2504051" y="3628177"/>
+            <a:off x="3029126" y="3628177"/>
             <a:ext cx="1433406" cy="276999"/>
           </a:xfrm>
           <a:prstGeom prst="rect">
@@ -15774,7 +15802,7 @@
         </p:nvSpPr>
         <p:spPr>
           <a:xfrm>
-            <a:off x="2515133" y="4478713"/>
+            <a:off x="3040208" y="4478713"/>
             <a:ext cx="1293944" cy="276999"/>
           </a:xfrm>
           <a:prstGeom prst="rect">
@@ -15804,7 +15832,7 @@
         </p:nvSpPr>
         <p:spPr>
           <a:xfrm>
-            <a:off x="2515133" y="4112886"/>
+            <a:off x="3040208" y="4112886"/>
             <a:ext cx="1418978" cy="307777"/>
           </a:xfrm>
           <a:prstGeom prst="rect">
@@ -15834,7 +15862,7 @@
         </p:nvSpPr>
         <p:spPr>
           <a:xfrm>
-            <a:off x="2529173" y="4305945"/>
+            <a:off x="3054248" y="4305945"/>
             <a:ext cx="1520673" cy="276999"/>
           </a:xfrm>
           <a:prstGeom prst="rect">
@@ -15864,7 +15892,7 @@
         </p:nvSpPr>
         <p:spPr>
           <a:xfrm>
-            <a:off x="2533801" y="5118098"/>
+            <a:off x="3058876" y="5118098"/>
             <a:ext cx="1287532" cy="276999"/>
           </a:xfrm>
           <a:prstGeom prst="rect">
@@ -15894,7 +15922,7 @@
         </p:nvSpPr>
         <p:spPr>
           <a:xfrm>
-            <a:off x="2533801" y="4752271"/>
+            <a:off x="3058876" y="4752271"/>
             <a:ext cx="1430648" cy="307777"/>
           </a:xfrm>
           <a:prstGeom prst="rect">
@@ -15924,7 +15952,7 @@
         </p:nvSpPr>
         <p:spPr>
           <a:xfrm>
-            <a:off x="2547841" y="4945330"/>
+            <a:off x="3072916" y="4945330"/>
             <a:ext cx="1101584" cy="276999"/>
           </a:xfrm>
           <a:prstGeom prst="rect">
@@ -15954,7 +15982,7 @@
         </p:nvSpPr>
         <p:spPr>
           <a:xfrm>
-            <a:off x="1868595" y="1234440"/>
+            <a:off x="2393670" y="1234440"/>
             <a:ext cx="2117000" cy="4480560"/>
           </a:xfrm>
           <a:prstGeom prst="rect">
@@ -15999,7 +16027,7 @@
         </p:nvSpPr>
         <p:spPr>
           <a:xfrm>
-            <a:off x="2441769" y="1363771"/>
+            <a:off x="2966844" y="1363771"/>
             <a:ext cx="748923" cy="369332"/>
           </a:xfrm>
           <a:prstGeom prst="rect">
@@ -16112,6 +16140,578 @@
           </a:p>
         </p:txBody>
       </p:sp>
+      <p:sp>
+        <p:nvSpPr>
+          <p:cNvPr id="51" name="Rounded Rectangle 50"/>
+          <p:cNvSpPr/>
+          <p:nvPr/>
+        </p:nvSpPr>
+        <p:spPr>
+          <a:xfrm>
+            <a:off x="2389302" y="1926548"/>
+            <a:ext cx="2100222" cy="498763"/>
+          </a:xfrm>
+          <a:prstGeom prst="roundRect">
+            <a:avLst/>
+          </a:prstGeom>
+          <a:solidFill>
+            <a:schemeClr val="accent3"/>
+          </a:solidFill>
+          <a:effectLst>
+            <a:outerShdw blurRad="50800" dist="25400" dir="2880000" algn="ctr" rotWithShape="0">
+              <a:srgbClr val="000000">
+                <a:alpha val="43137"/>
+              </a:srgbClr>
+            </a:outerShdw>
+          </a:effectLst>
+        </p:spPr>
+        <p:style>
+          <a:lnRef idx="1">
+            <a:schemeClr val="dk1"/>
+          </a:lnRef>
+          <a:fillRef idx="1003">
+            <a:schemeClr val="lt2"/>
+          </a:fillRef>
+          <a:effectRef idx="1">
+            <a:schemeClr val="dk1"/>
+          </a:effectRef>
+          <a:fontRef idx="minor">
+            <a:schemeClr val="dk1"/>
+          </a:fontRef>
+        </p:style>
+        <p:txBody>
+          <a:bodyPr rtlCol="0" anchor="ctr"/>
+          <a:lstStyle/>
+          <a:p>
+            <a:pPr algn="ctr"/>
+            <a:r>
+              <a:rPr lang="en-US" dirty="0" smtClean="0"/>
+              <a:t>Home</a:t>
+            </a:r>
+            <a:endParaRPr lang="en-US" dirty="0"/>
+          </a:p>
+        </p:txBody>
+      </p:sp>
+      <p:sp>
+        <p:nvSpPr>
+          <p:cNvPr id="70" name="Rounded Rectangle 69"/>
+          <p:cNvSpPr/>
+          <p:nvPr/>
+        </p:nvSpPr>
+        <p:spPr>
+          <a:xfrm>
+            <a:off x="7998497" y="1965199"/>
+            <a:ext cx="2119184" cy="885197"/>
+          </a:xfrm>
+          <a:prstGeom prst="roundRect">
+            <a:avLst/>
+          </a:prstGeom>
+          <a:solidFill>
+            <a:schemeClr val="accent3"/>
+          </a:solidFill>
+          <a:effectLst>
+            <a:outerShdw blurRad="50800" dist="25400" dir="2880000" algn="ctr" rotWithShape="0">
+              <a:srgbClr val="000000">
+                <a:alpha val="43137"/>
+              </a:srgbClr>
+            </a:outerShdw>
+          </a:effectLst>
+        </p:spPr>
+        <p:style>
+          <a:lnRef idx="1">
+            <a:schemeClr val="dk1"/>
+          </a:lnRef>
+          <a:fillRef idx="1003">
+            <a:schemeClr val="lt2"/>
+          </a:fillRef>
+          <a:effectRef idx="1">
+            <a:schemeClr val="dk1"/>
+          </a:effectRef>
+          <a:fontRef idx="minor">
+            <a:schemeClr val="dk1"/>
+          </a:fontRef>
+        </p:style>
+        <p:txBody>
+          <a:bodyPr rtlCol="0" anchor="ctr"/>
+          <a:lstStyle/>
+          <a:p>
+            <a:pPr algn="ctr"/>
+            <a:r>
+              <a:rPr lang="en-US" dirty="0" smtClean="0"/>
+              <a:t>Logout</a:t>
+            </a:r>
+            <a:endParaRPr lang="en-US" dirty="0"/>
+          </a:p>
+        </p:txBody>
+      </p:sp>
+      <p:sp>
+        <p:nvSpPr>
+          <p:cNvPr id="87" name="Rounded Rectangle 86"/>
+          <p:cNvSpPr/>
+          <p:nvPr/>
+        </p:nvSpPr>
+        <p:spPr>
+          <a:xfrm>
+            <a:off x="7998497" y="2858415"/>
+            <a:ext cx="2119184" cy="885197"/>
+          </a:xfrm>
+          <a:prstGeom prst="roundRect">
+            <a:avLst/>
+          </a:prstGeom>
+          <a:solidFill>
+            <a:schemeClr val="accent3"/>
+          </a:solidFill>
+          <a:effectLst>
+            <a:outerShdw blurRad="50800" dist="25400" dir="2880000" algn="ctr" rotWithShape="0">
+              <a:srgbClr val="000000">
+                <a:alpha val="43137"/>
+              </a:srgbClr>
+            </a:outerShdw>
+          </a:effectLst>
+        </p:spPr>
+        <p:style>
+          <a:lnRef idx="1">
+            <a:schemeClr val="dk1"/>
+          </a:lnRef>
+          <a:fillRef idx="1003">
+            <a:schemeClr val="lt2"/>
+          </a:fillRef>
+          <a:effectRef idx="1">
+            <a:schemeClr val="dk1"/>
+          </a:effectRef>
+          <a:fontRef idx="minor">
+            <a:schemeClr val="dk1"/>
+          </a:fontRef>
+        </p:style>
+        <p:txBody>
+          <a:bodyPr rtlCol="0" anchor="ctr"/>
+          <a:lstStyle/>
+          <a:p>
+            <a:pPr algn="ctr"/>
+            <a:r>
+              <a:rPr lang="en-US" dirty="0" smtClean="0"/>
+              <a:t>Help</a:t>
+            </a:r>
+            <a:endParaRPr lang="en-US" dirty="0"/>
+          </a:p>
+        </p:txBody>
+      </p:sp>
+      <p:sp>
+        <p:nvSpPr>
+          <p:cNvPr id="90" name="Rounded Rectangle 89"/>
+          <p:cNvSpPr/>
+          <p:nvPr/>
+        </p:nvSpPr>
+        <p:spPr>
+          <a:xfrm>
+            <a:off x="7998497" y="3751631"/>
+            <a:ext cx="2119184" cy="885197"/>
+          </a:xfrm>
+          <a:prstGeom prst="roundRect">
+            <a:avLst/>
+          </a:prstGeom>
+          <a:solidFill>
+            <a:schemeClr val="accent3"/>
+          </a:solidFill>
+          <a:effectLst>
+            <a:outerShdw blurRad="50800" dist="25400" dir="2880000" algn="ctr" rotWithShape="0">
+              <a:srgbClr val="000000">
+                <a:alpha val="43137"/>
+              </a:srgbClr>
+            </a:outerShdw>
+          </a:effectLst>
+        </p:spPr>
+        <p:style>
+          <a:lnRef idx="1">
+            <a:schemeClr val="dk1"/>
+          </a:lnRef>
+          <a:fillRef idx="1003">
+            <a:schemeClr val="lt2"/>
+          </a:fillRef>
+          <a:effectRef idx="1">
+            <a:schemeClr val="dk1"/>
+          </a:effectRef>
+          <a:fontRef idx="minor">
+            <a:schemeClr val="dk1"/>
+          </a:fontRef>
+        </p:style>
+        <p:txBody>
+          <a:bodyPr rtlCol="0" anchor="ctr"/>
+          <a:lstStyle/>
+          <a:p>
+            <a:pPr algn="ctr"/>
+            <a:r>
+              <a:rPr lang="en-US" dirty="0" smtClean="0"/>
+              <a:t>Settings</a:t>
+            </a:r>
+            <a:endParaRPr lang="en-US" dirty="0"/>
+          </a:p>
+        </p:txBody>
+      </p:sp>
+      <p:sp>
+        <p:nvSpPr>
+          <p:cNvPr id="91" name="Rounded Rectangle 90"/>
+          <p:cNvSpPr/>
+          <p:nvPr/>
+        </p:nvSpPr>
+        <p:spPr>
+          <a:xfrm>
+            <a:off x="7998497" y="4641230"/>
+            <a:ext cx="2119184" cy="885197"/>
+          </a:xfrm>
+          <a:prstGeom prst="roundRect">
+            <a:avLst/>
+          </a:prstGeom>
+          <a:solidFill>
+            <a:schemeClr val="accent3"/>
+          </a:solidFill>
+          <a:effectLst>
+            <a:outerShdw blurRad="50800" dist="25400" dir="2880000" algn="ctr" rotWithShape="0">
+              <a:srgbClr val="000000">
+                <a:alpha val="43137"/>
+              </a:srgbClr>
+            </a:outerShdw>
+          </a:effectLst>
+        </p:spPr>
+        <p:style>
+          <a:lnRef idx="1">
+            <a:schemeClr val="dk1"/>
+          </a:lnRef>
+          <a:fillRef idx="1003">
+            <a:schemeClr val="lt2"/>
+          </a:fillRef>
+          <a:effectRef idx="1">
+            <a:schemeClr val="dk1"/>
+          </a:effectRef>
+          <a:fontRef idx="minor">
+            <a:schemeClr val="dk1"/>
+          </a:fontRef>
+        </p:style>
+        <p:txBody>
+          <a:bodyPr rtlCol="0" anchor="ctr"/>
+          <a:lstStyle/>
+          <a:p>
+            <a:pPr algn="ctr"/>
+            <a:r>
+              <a:rPr lang="en-US" dirty="0" smtClean="0"/>
+              <a:t>Contact</a:t>
+            </a:r>
+            <a:endParaRPr lang="en-US" dirty="0"/>
+          </a:p>
+        </p:txBody>
+      </p:sp>
+      <p:sp>
+        <p:nvSpPr>
+          <p:cNvPr id="92" name="Rounded Rectangle 91"/>
+          <p:cNvSpPr/>
+          <p:nvPr/>
+        </p:nvSpPr>
+        <p:spPr>
+          <a:xfrm>
+            <a:off x="2392565" y="2409263"/>
+            <a:ext cx="2100222" cy="498763"/>
+          </a:xfrm>
+          <a:prstGeom prst="roundRect">
+            <a:avLst/>
+          </a:prstGeom>
+          <a:solidFill>
+            <a:schemeClr val="accent3"/>
+          </a:solidFill>
+          <a:effectLst>
+            <a:outerShdw blurRad="50800" dist="25400" dir="2880000" algn="ctr" rotWithShape="0">
+              <a:srgbClr val="000000">
+                <a:alpha val="43137"/>
+              </a:srgbClr>
+            </a:outerShdw>
+          </a:effectLst>
+        </p:spPr>
+        <p:style>
+          <a:lnRef idx="1">
+            <a:schemeClr val="dk1"/>
+          </a:lnRef>
+          <a:fillRef idx="1003">
+            <a:schemeClr val="lt2"/>
+          </a:fillRef>
+          <a:effectRef idx="1">
+            <a:schemeClr val="dk1"/>
+          </a:effectRef>
+          <a:fontRef idx="minor">
+            <a:schemeClr val="dk1"/>
+          </a:fontRef>
+        </p:style>
+        <p:txBody>
+          <a:bodyPr rtlCol="0" anchor="ctr"/>
+          <a:lstStyle/>
+          <a:p>
+            <a:pPr algn="ctr"/>
+            <a:r>
+              <a:rPr lang="en-US" dirty="0" smtClean="0"/>
+              <a:t>My Profile</a:t>
+            </a:r>
+            <a:endParaRPr lang="en-US" dirty="0"/>
+          </a:p>
+        </p:txBody>
+      </p:sp>
+      <p:sp>
+        <p:nvSpPr>
+          <p:cNvPr id="93" name="Rounded Rectangle 92"/>
+          <p:cNvSpPr/>
+          <p:nvPr/>
+        </p:nvSpPr>
+        <p:spPr>
+          <a:xfrm>
+            <a:off x="2409551" y="2922382"/>
+            <a:ext cx="2100222" cy="498763"/>
+          </a:xfrm>
+          <a:prstGeom prst="roundRect">
+            <a:avLst/>
+          </a:prstGeom>
+          <a:solidFill>
+            <a:schemeClr val="accent3"/>
+          </a:solidFill>
+          <a:effectLst>
+            <a:outerShdw blurRad="50800" dist="25400" dir="2880000" algn="ctr" rotWithShape="0">
+              <a:srgbClr val="000000">
+                <a:alpha val="43137"/>
+              </a:srgbClr>
+            </a:outerShdw>
+          </a:effectLst>
+        </p:spPr>
+        <p:style>
+          <a:lnRef idx="1">
+            <a:schemeClr val="dk1"/>
+          </a:lnRef>
+          <a:fillRef idx="1003">
+            <a:schemeClr val="lt2"/>
+          </a:fillRef>
+          <a:effectRef idx="1">
+            <a:schemeClr val="dk1"/>
+          </a:effectRef>
+          <a:fontRef idx="minor">
+            <a:schemeClr val="dk1"/>
+          </a:fontRef>
+        </p:style>
+        <p:txBody>
+          <a:bodyPr rtlCol="0" anchor="ctr"/>
+          <a:lstStyle/>
+          <a:p>
+            <a:pPr algn="ctr"/>
+            <a:r>
+              <a:rPr lang="en-US" dirty="0" smtClean="0"/>
+              <a:t>Friends</a:t>
+            </a:r>
+            <a:endParaRPr lang="en-US" dirty="0"/>
+          </a:p>
+        </p:txBody>
+      </p:sp>
+      <p:sp>
+        <p:nvSpPr>
+          <p:cNvPr id="94" name="Rounded Rectangle 93"/>
+          <p:cNvSpPr/>
+          <p:nvPr/>
+        </p:nvSpPr>
+        <p:spPr>
+          <a:xfrm>
+            <a:off x="2379406" y="3989068"/>
+            <a:ext cx="2100222" cy="539280"/>
+          </a:xfrm>
+          <a:prstGeom prst="roundRect">
+            <a:avLst/>
+          </a:prstGeom>
+          <a:solidFill>
+            <a:schemeClr val="accent3"/>
+          </a:solidFill>
+          <a:effectLst>
+            <a:outerShdw blurRad="50800" dist="25400" dir="2880000" algn="ctr" rotWithShape="0">
+              <a:srgbClr val="000000">
+                <a:alpha val="43137"/>
+              </a:srgbClr>
+            </a:outerShdw>
+          </a:effectLst>
+        </p:spPr>
+        <p:style>
+          <a:lnRef idx="1">
+            <a:schemeClr val="dk1"/>
+          </a:lnRef>
+          <a:fillRef idx="1003">
+            <a:schemeClr val="lt2"/>
+          </a:fillRef>
+          <a:effectRef idx="1">
+            <a:schemeClr val="dk1"/>
+          </a:effectRef>
+          <a:fontRef idx="minor">
+            <a:schemeClr val="dk1"/>
+          </a:fontRef>
+        </p:style>
+        <p:txBody>
+          <a:bodyPr rtlCol="0" anchor="ctr"/>
+          <a:lstStyle/>
+          <a:p>
+            <a:pPr algn="ctr"/>
+            <a:r>
+              <a:rPr lang="en-US" dirty="0" smtClean="0"/>
+              <a:t>Messages</a:t>
+            </a:r>
+            <a:endParaRPr lang="en-US" dirty="0"/>
+          </a:p>
+        </p:txBody>
+      </p:sp>
+      <p:sp>
+        <p:nvSpPr>
+          <p:cNvPr id="96" name="Rounded Rectangle 95"/>
+          <p:cNvSpPr/>
+          <p:nvPr/>
+        </p:nvSpPr>
+        <p:spPr>
+          <a:xfrm>
+            <a:off x="2403702" y="5115926"/>
+            <a:ext cx="2100222" cy="545708"/>
+          </a:xfrm>
+          <a:prstGeom prst="roundRect">
+            <a:avLst/>
+          </a:prstGeom>
+          <a:solidFill>
+            <a:schemeClr val="accent3"/>
+          </a:solidFill>
+          <a:effectLst>
+            <a:outerShdw blurRad="50800" dist="25400" dir="2880000" algn="ctr" rotWithShape="0">
+              <a:srgbClr val="000000">
+                <a:alpha val="43137"/>
+              </a:srgbClr>
+            </a:outerShdw>
+          </a:effectLst>
+        </p:spPr>
+        <p:style>
+          <a:lnRef idx="1">
+            <a:schemeClr val="dk1"/>
+          </a:lnRef>
+          <a:fillRef idx="1003">
+            <a:schemeClr val="lt2"/>
+          </a:fillRef>
+          <a:effectRef idx="1">
+            <a:schemeClr val="dk1"/>
+          </a:effectRef>
+          <a:fontRef idx="minor">
+            <a:schemeClr val="dk1"/>
+          </a:fontRef>
+        </p:style>
+        <p:txBody>
+          <a:bodyPr rtlCol="0" anchor="ctr"/>
+          <a:lstStyle/>
+          <a:p>
+            <a:pPr algn="ctr"/>
+            <a:r>
+              <a:rPr lang="en-US" dirty="0" smtClean="0"/>
+              <a:t>Discover</a:t>
+            </a:r>
+            <a:endParaRPr lang="en-US" dirty="0"/>
+          </a:p>
+        </p:txBody>
+      </p:sp>
+      <p:sp>
+        <p:nvSpPr>
+          <p:cNvPr id="97" name="Rounded Rectangle 96"/>
+          <p:cNvSpPr/>
+          <p:nvPr/>
+        </p:nvSpPr>
+        <p:spPr>
+          <a:xfrm>
+            <a:off x="2374384" y="4522095"/>
+            <a:ext cx="2100222" cy="592627"/>
+          </a:xfrm>
+          <a:prstGeom prst="roundRect">
+            <a:avLst/>
+          </a:prstGeom>
+          <a:solidFill>
+            <a:schemeClr val="accent3"/>
+          </a:solidFill>
+          <a:effectLst>
+            <a:outerShdw blurRad="50800" dist="25400" dir="2880000" algn="ctr" rotWithShape="0">
+              <a:srgbClr val="000000">
+                <a:alpha val="43137"/>
+              </a:srgbClr>
+            </a:outerShdw>
+          </a:effectLst>
+        </p:spPr>
+        <p:style>
+          <a:lnRef idx="1">
+            <a:schemeClr val="dk1"/>
+          </a:lnRef>
+          <a:fillRef idx="1003">
+            <a:schemeClr val="lt2"/>
+          </a:fillRef>
+          <a:effectRef idx="1">
+            <a:schemeClr val="dk1"/>
+          </a:effectRef>
+          <a:fontRef idx="minor">
+            <a:schemeClr val="dk1"/>
+          </a:fontRef>
+        </p:style>
+        <p:txBody>
+          <a:bodyPr rtlCol="0" anchor="ctr"/>
+          <a:lstStyle/>
+          <a:p>
+            <a:pPr algn="ctr"/>
+            <a:r>
+              <a:rPr lang="en-US" dirty="0" smtClean="0"/>
+              <a:t>Achievements</a:t>
+            </a:r>
+            <a:endParaRPr lang="en-US" dirty="0"/>
+          </a:p>
+        </p:txBody>
+      </p:sp>
+      <p:sp>
+        <p:nvSpPr>
+          <p:cNvPr id="98" name="Rounded Rectangle 97"/>
+          <p:cNvSpPr/>
+          <p:nvPr/>
+        </p:nvSpPr>
+        <p:spPr>
+          <a:xfrm>
+            <a:off x="2376963" y="3427769"/>
+            <a:ext cx="2100222" cy="545157"/>
+          </a:xfrm>
+          <a:prstGeom prst="roundRect">
+            <a:avLst/>
+          </a:prstGeom>
+          <a:solidFill>
+            <a:schemeClr val="accent3"/>
+          </a:solidFill>
+          <a:effectLst>
+            <a:outerShdw blurRad="50800" dist="25400" dir="2880000" algn="ctr" rotWithShape="0">
+              <a:srgbClr val="000000">
+                <a:alpha val="43137"/>
+              </a:srgbClr>
+            </a:outerShdw>
+          </a:effectLst>
+        </p:spPr>
+        <p:style>
+          <a:lnRef idx="1">
+            <a:schemeClr val="dk1"/>
+          </a:lnRef>
+          <a:fillRef idx="1003">
+            <a:schemeClr val="lt2"/>
+          </a:fillRef>
+          <a:effectRef idx="1">
+            <a:schemeClr val="dk1"/>
+          </a:effectRef>
+          <a:fontRef idx="minor">
+            <a:schemeClr val="dk1"/>
+          </a:fontRef>
+        </p:style>
+        <p:txBody>
+          <a:bodyPr rtlCol="0" anchor="ctr"/>
+          <a:lstStyle/>
+          <a:p>
+            <a:pPr algn="ctr"/>
+            <a:r>
+              <a:rPr lang="en-US" dirty="0" smtClean="0"/>
+              <a:t>Events</a:t>
+            </a:r>
+            <a:endParaRPr lang="en-US" dirty="0"/>
+          </a:p>
+        </p:txBody>
+      </p:sp>
     </p:spTree>
     <p:extLst>
       <p:ext uri="{BB962C8B-B14F-4D97-AF65-F5344CB8AC3E}">
@@ -16122,6 +16722,13 @@
   <p:clrMapOvr>
     <a:masterClrMapping/>
   </p:clrMapOvr>
+  <p:timing>
+    <p:tnLst>
+      <p:par>
+        <p:cTn id="1" dur="indefinite" restart="never" nodeType="tmRoot"/>
+      </p:par>
+    </p:tnLst>
+  </p:timing>
 </p:sld>
 </file>
 
@@ -16948,6 +17555,13 @@
   <p:clrMapOvr>
     <a:masterClrMapping/>
   </p:clrMapOvr>
+  <p:timing>
+    <p:tnLst>
+      <p:par>
+        <p:cTn id="1" dur="indefinite" restart="never" nodeType="tmRoot"/>
+      </p:par>
+    </p:tnLst>
+  </p:timing>
 </p:sld>
 </file>
 

</xml_diff>